<commit_message>
-Added the user guid in a seperated file -Added conclusion to the book -Removed comments from the presentation
</commit_message>
<xml_diff>
--- a/Capstone Project Phase B–23-2-D-17.pptx
+++ b/Capstone Project Phase B–23-2-D-17.pptx
@@ -223,7 +223,7 @@
           <a:p>
             <a:fld id="{2442D881-CA12-4970-8156-2388B9CD2E9F}" type="datetimeFigureOut">
               <a:rPr lang="en-IL" smtClean="0"/>
-              <a:t>04/05/2024</a:t>
+              <a:t>05/05/2024</a:t>
             </a:fld>
             <a:endParaRPr lang="en-IL"/>
           </a:p>
@@ -535,7 +535,7 @@
           <a:bodyPr/>
           <a:lstStyle/>
           <a:p>
-            <a:endParaRPr lang="he-IL"/>
+            <a:endParaRPr lang="he-IL" dirty="0"/>
           </a:p>
         </p:txBody>
       </p:sp>
@@ -636,17 +636,6 @@
               <a:tabLst/>
               <a:defRPr/>
             </a:pPr>
-            <a:r>
-              <a:rPr lang="en-US" sz="1800" b="1" i="0" dirty="0">
-                <a:solidFill>
-                  <a:srgbClr val="FF9300"/>
-                </a:solidFill>
-                <a:effectLst/>
-                <a:latin typeface="Poppins" panose="020B0502040204020203" pitchFamily="2" charset="0"/>
-                <a:cs typeface="Arial" panose="020B0604020202020204" pitchFamily="34" charset="0"/>
-              </a:rPr>
-              <a:t>Package diagrams</a:t>
-            </a:r>
             <a:endParaRPr lang="en-US" b="1" i="0" dirty="0">
               <a:solidFill>
                 <a:srgbClr val="FF9300"/>
@@ -754,17 +743,6 @@
               <a:tabLst/>
               <a:defRPr/>
             </a:pPr>
-            <a:r>
-              <a:rPr lang="en-US" sz="1800" b="1" i="0" dirty="0">
-                <a:solidFill>
-                  <a:srgbClr val="FF9300"/>
-                </a:solidFill>
-                <a:effectLst/>
-                <a:latin typeface="Poppins" panose="020B0502040204020203" pitchFamily="2" charset="0"/>
-                <a:cs typeface="Arial" panose="020B0604020202020204" pitchFamily="34" charset="0"/>
-              </a:rPr>
-              <a:t>Package diagrams</a:t>
-            </a:r>
             <a:endParaRPr lang="en-US" b="1" i="0" dirty="0">
               <a:solidFill>
                 <a:srgbClr val="FF9300"/>
@@ -872,17 +850,6 @@
               <a:tabLst/>
               <a:defRPr/>
             </a:pPr>
-            <a:r>
-              <a:rPr lang="en-US" sz="1800" b="1" i="0" dirty="0">
-                <a:solidFill>
-                  <a:srgbClr val="FF9300"/>
-                </a:solidFill>
-                <a:effectLst/>
-                <a:latin typeface="Poppins" panose="020B0502040204020203" pitchFamily="2" charset="0"/>
-                <a:cs typeface="Arial" panose="020B0604020202020204" pitchFamily="34" charset="0"/>
-              </a:rPr>
-              <a:t>Package diagrams</a:t>
-            </a:r>
             <a:endParaRPr lang="en-US" b="1" i="0" dirty="0">
               <a:solidFill>
                 <a:srgbClr val="FF9300"/>
@@ -990,17 +957,6 @@
               <a:tabLst/>
               <a:defRPr/>
             </a:pPr>
-            <a:r>
-              <a:rPr lang="en-US" sz="1800" b="1" i="0" dirty="0">
-                <a:solidFill>
-                  <a:srgbClr val="FF9300"/>
-                </a:solidFill>
-                <a:effectLst/>
-                <a:latin typeface="Poppins" panose="020B0502040204020203" pitchFamily="2" charset="0"/>
-                <a:cs typeface="Arial" panose="020B0604020202020204" pitchFamily="34" charset="0"/>
-              </a:rPr>
-              <a:t>Package diagrams</a:t>
-            </a:r>
             <a:endParaRPr lang="en-US" b="1" i="0" dirty="0">
               <a:solidFill>
                 <a:srgbClr val="FF9300"/>
@@ -1108,17 +1064,6 @@
               <a:tabLst/>
               <a:defRPr/>
             </a:pPr>
-            <a:r>
-              <a:rPr lang="en-US" sz="1800" b="1" i="0" dirty="0">
-                <a:solidFill>
-                  <a:srgbClr val="FF9300"/>
-                </a:solidFill>
-                <a:effectLst/>
-                <a:latin typeface="Poppins" panose="020B0502040204020203" pitchFamily="2" charset="0"/>
-                <a:cs typeface="Arial" panose="020B0604020202020204" pitchFamily="34" charset="0"/>
-              </a:rPr>
-              <a:t>Activity diagrams</a:t>
-            </a:r>
             <a:endParaRPr lang="en-US" b="1" i="0" dirty="0">
               <a:solidFill>
                 <a:srgbClr val="FF9300"/>
@@ -1226,14 +1171,6 @@
               <a:tabLst/>
               <a:defRPr/>
             </a:pPr>
-            <a:r>
-              <a:rPr lang="he-IL" sz="1800" dirty="0">
-                <a:effectLst/>
-                <a:ea typeface="Arial" panose="020B0604020202020204" pitchFamily="34" charset="0"/>
-                <a:cs typeface="Arial" panose="020B0604020202020204" pitchFamily="34" charset="0"/>
-              </a:rPr>
-              <a:t>תיאור הפתרון </a:t>
-            </a:r>
             <a:endParaRPr lang="en-IL" dirty="0"/>
           </a:p>
         </p:txBody>
@@ -1318,14 +1255,6 @@
           <a:bodyPr/>
           <a:lstStyle/>
           <a:p>
-            <a:r>
-              <a:rPr lang="he-IL" sz="1800" dirty="0">
-                <a:effectLst/>
-                <a:ea typeface="Arial" panose="020B0604020202020204" pitchFamily="34" charset="0"/>
-                <a:cs typeface="Arial" panose="020B0604020202020204" pitchFamily="34" charset="0"/>
-              </a:rPr>
-              <a:t>תיאור הפתרון </a:t>
-            </a:r>
             <a:endParaRPr lang="en-IL" dirty="0"/>
           </a:p>
         </p:txBody>
@@ -1410,14 +1339,6 @@
           <a:bodyPr/>
           <a:lstStyle/>
           <a:p>
-            <a:r>
-              <a:rPr lang="he-IL" sz="1800" dirty="0">
-                <a:effectLst/>
-                <a:ea typeface="Arial" panose="020B0604020202020204" pitchFamily="34" charset="0"/>
-                <a:cs typeface="Arial" panose="020B0604020202020204" pitchFamily="34" charset="0"/>
-              </a:rPr>
-              <a:t>תיאור הפתרון </a:t>
-            </a:r>
             <a:endParaRPr lang="en-IL" dirty="0"/>
           </a:p>
         </p:txBody>
@@ -1502,29 +1423,11 @@
           <a:bodyPr/>
           <a:lstStyle/>
           <a:p>
-            <a:r>
-              <a:rPr lang="he-IL" sz="1800" dirty="0">
-                <a:effectLst/>
-                <a:ea typeface="Arial" panose="020B0604020202020204" pitchFamily="34" charset="0"/>
-                <a:cs typeface="Arial" panose="020B0604020202020204" pitchFamily="34" charset="0"/>
-              </a:rPr>
-              <a:t>תיאור הפתרון </a:t>
-            </a:r>
             <a:endParaRPr lang="en-US" sz="1800" dirty="0">
               <a:effectLst/>
               <a:ea typeface="Arial" panose="020B0604020202020204" pitchFamily="34" charset="0"/>
               <a:cs typeface="Arial" panose="020B0604020202020204" pitchFamily="34" charset="0"/>
             </a:endParaRPr>
-          </a:p>
-          <a:p>
-            <a:r>
-              <a:rPr lang="he-IL" sz="1800" dirty="0">
-                <a:effectLst/>
-                <a:cs typeface="Arial" panose="020B0604020202020204" pitchFamily="34" charset="0"/>
-              </a:rPr>
-              <a:t>להוסיף?</a:t>
-            </a:r>
-            <a:endParaRPr lang="en-IL" dirty="0"/>
           </a:p>
         </p:txBody>
       </p:sp>
@@ -1608,14 +1511,6 @@
           <a:bodyPr/>
           <a:lstStyle/>
           <a:p>
-            <a:r>
-              <a:rPr lang="he-IL" sz="1800" dirty="0">
-                <a:effectLst/>
-                <a:ea typeface="Arial" panose="020B0604020202020204" pitchFamily="34" charset="0"/>
-                <a:cs typeface="Arial" panose="020B0604020202020204" pitchFamily="34" charset="0"/>
-              </a:rPr>
-              <a:t>תיאור הפתרון </a:t>
-            </a:r>
             <a:endParaRPr lang="en-IL" dirty="0"/>
           </a:p>
         </p:txBody>
@@ -1717,25 +1612,6 @@
               <a:tabLst/>
               <a:defRPr/>
             </a:pPr>
-            <a:r>
-              <a:rPr lang="he-IL" sz="1800" u="none" strike="noStrike" dirty="0">
-                <a:effectLst/>
-                <a:latin typeface="Arial" panose="020B0604020202020204" pitchFamily="34" charset="0"/>
-                <a:ea typeface="Arial" panose="020B0604020202020204" pitchFamily="34" charset="0"/>
-              </a:rPr>
-              <a:t>הצגה קצרה של הרקע: הבעיה, הצורך לפיתוח המערכת </a:t>
-            </a:r>
-            <a:endParaRPr lang="en-IL" sz="1800" u="none" strike="noStrike" dirty="0">
-              <a:effectLst/>
-              <a:latin typeface="Arial" panose="020B0604020202020204" pitchFamily="34" charset="0"/>
-              <a:ea typeface="Arial" panose="020B0604020202020204" pitchFamily="34" charset="0"/>
-            </a:endParaRPr>
-          </a:p>
-          <a:p>
-            <a:r>
-              <a:rPr lang="he-IL" dirty="0"/>
-              <a:t>הבעיה</a:t>
-            </a:r>
             <a:endParaRPr lang="en-IL" dirty="0"/>
           </a:p>
         </p:txBody>
@@ -1820,14 +1696,6 @@
           <a:bodyPr/>
           <a:lstStyle/>
           <a:p>
-            <a:r>
-              <a:rPr lang="he-IL" sz="1800" dirty="0">
-                <a:effectLst/>
-                <a:ea typeface="Arial" panose="020B0604020202020204" pitchFamily="34" charset="0"/>
-                <a:cs typeface="Arial" panose="020B0604020202020204" pitchFamily="34" charset="0"/>
-              </a:rPr>
-              <a:t>תיאור הפתרון </a:t>
-            </a:r>
             <a:endParaRPr lang="en-IL" dirty="0"/>
           </a:p>
         </p:txBody>
@@ -1929,14 +1797,6 @@
               <a:tabLst/>
               <a:defRPr/>
             </a:pPr>
-            <a:r>
-              <a:rPr lang="he-IL" sz="1800" dirty="0">
-                <a:effectLst/>
-                <a:ea typeface="Arial" panose="020B0604020202020204" pitchFamily="34" charset="0"/>
-                <a:cs typeface="Arial" panose="020B0604020202020204" pitchFamily="34" charset="0"/>
-              </a:rPr>
-              <a:t>תיאור אתגרים ובעיות </a:t>
-            </a:r>
             <a:endParaRPr lang="en-IL" dirty="0"/>
           </a:p>
         </p:txBody>
@@ -2038,14 +1898,6 @@
               <a:tabLst/>
               <a:defRPr/>
             </a:pPr>
-            <a:r>
-              <a:rPr lang="he-IL" sz="1800" dirty="0">
-                <a:effectLst/>
-                <a:ea typeface="Arial" panose="020B0604020202020204" pitchFamily="34" charset="0"/>
-                <a:cs typeface="Arial" panose="020B0604020202020204" pitchFamily="34" charset="0"/>
-              </a:rPr>
-              <a:t>תיאור אתגרים ובעיות </a:t>
-            </a:r>
             <a:endParaRPr lang="en-IL" dirty="0"/>
           </a:p>
         </p:txBody>
@@ -2635,25 +2487,6 @@
               <a:tabLst/>
               <a:defRPr/>
             </a:pPr>
-            <a:r>
-              <a:rPr lang="he-IL" sz="1800" u="none" strike="noStrike" dirty="0">
-                <a:effectLst/>
-                <a:latin typeface="Arial" panose="020B0604020202020204" pitchFamily="34" charset="0"/>
-                <a:ea typeface="Arial" panose="020B0604020202020204" pitchFamily="34" charset="0"/>
-              </a:rPr>
-              <a:t>הצגה קצרה של הרקע: הבעיה, הצורך לפיתוח המערכת </a:t>
-            </a:r>
-            <a:endParaRPr lang="en-IL" sz="1800" u="none" strike="noStrike" dirty="0">
-              <a:effectLst/>
-              <a:latin typeface="Arial" panose="020B0604020202020204" pitchFamily="34" charset="0"/>
-              <a:ea typeface="Arial" panose="020B0604020202020204" pitchFamily="34" charset="0"/>
-            </a:endParaRPr>
-          </a:p>
-          <a:p>
-            <a:r>
-              <a:rPr lang="he-IL" dirty="0"/>
-              <a:t>הצורך בפיתוח</a:t>
-            </a:r>
             <a:endParaRPr lang="en-IL" dirty="0"/>
           </a:p>
         </p:txBody>
@@ -2738,51 +2571,6 @@
           <a:bodyPr/>
           <a:lstStyle/>
           <a:p>
-            <a:pPr marL="0" marR="0" lvl="0" indent="0" algn="l" defTabSz="914400" rtl="0" eaLnBrk="1" fontAlgn="auto" latinLnBrk="0" hangingPunct="1">
-              <a:lnSpc>
-                <a:spcPct val="100000"/>
-              </a:lnSpc>
-              <a:spcBef>
-                <a:spcPts val="0"/>
-              </a:spcBef>
-              <a:spcAft>
-                <a:spcPts val="0"/>
-              </a:spcAft>
-              <a:buClrTx/>
-              <a:buSzTx/>
-              <a:buFontTx/>
-              <a:buNone/>
-              <a:tabLst/>
-              <a:defRPr/>
-            </a:pPr>
-            <a:r>
-              <a:rPr lang="he-IL" sz="1800" u="none" strike="noStrike" dirty="0">
-                <a:effectLst/>
-                <a:latin typeface="Arial" panose="020B0604020202020204" pitchFamily="34" charset="0"/>
-                <a:ea typeface="Arial" panose="020B0604020202020204" pitchFamily="34" charset="0"/>
-              </a:rPr>
-              <a:t>הצגה קצרה של הרקע: הבעיה, הצורך לפיתוח המערכת </a:t>
-            </a:r>
-            <a:endParaRPr lang="en-IL" sz="1800" u="none" strike="noStrike" dirty="0">
-              <a:effectLst/>
-              <a:latin typeface="Arial" panose="020B0604020202020204" pitchFamily="34" charset="0"/>
-              <a:ea typeface="Arial" panose="020B0604020202020204" pitchFamily="34" charset="0"/>
-            </a:endParaRPr>
-          </a:p>
-          <a:p>
-            <a:r>
-              <a:rPr lang="he-IL" dirty="0"/>
-              <a:t>הבעיה – האלגוריתמים</a:t>
-            </a:r>
-            <a:endParaRPr lang="en-US" dirty="0"/>
-          </a:p>
-          <a:p>
-            <a:endParaRPr lang="en-US" dirty="0"/>
-          </a:p>
-          <a:p>
-            <a:endParaRPr lang="en-US" dirty="0"/>
-          </a:p>
-          <a:p>
             <a:endParaRPr lang="en-IL" dirty="0"/>
           </a:p>
         </p:txBody>
@@ -2867,57 +2655,6 @@
           <a:bodyPr/>
           <a:lstStyle/>
           <a:p>
-            <a:pPr marL="0" marR="0" lvl="0" indent="0" algn="l" defTabSz="914400" rtl="0" eaLnBrk="1" fontAlgn="auto" latinLnBrk="0" hangingPunct="1">
-              <a:lnSpc>
-                <a:spcPct val="100000"/>
-              </a:lnSpc>
-              <a:spcBef>
-                <a:spcPts val="0"/>
-              </a:spcBef>
-              <a:spcAft>
-                <a:spcPts val="0"/>
-              </a:spcAft>
-              <a:buClrTx/>
-              <a:buSzTx/>
-              <a:buFontTx/>
-              <a:buNone/>
-              <a:tabLst/>
-              <a:defRPr/>
-            </a:pPr>
-            <a:r>
-              <a:rPr lang="he-IL" sz="1800" u="none" strike="noStrike" dirty="0">
-                <a:effectLst/>
-                <a:latin typeface="Arial" panose="020B0604020202020204" pitchFamily="34" charset="0"/>
-                <a:ea typeface="Arial" panose="020B0604020202020204" pitchFamily="34" charset="0"/>
-              </a:rPr>
-              <a:t>הדרישות המרכזיות של הפתרון</a:t>
-            </a:r>
-          </a:p>
-          <a:p>
-            <a:pPr marL="0" marR="0" lvl="0" indent="0" algn="l" defTabSz="914400" rtl="0" eaLnBrk="1" fontAlgn="auto" latinLnBrk="0" hangingPunct="1">
-              <a:lnSpc>
-                <a:spcPct val="100000"/>
-              </a:lnSpc>
-              <a:spcBef>
-                <a:spcPts val="0"/>
-              </a:spcBef>
-              <a:spcAft>
-                <a:spcPts val="0"/>
-              </a:spcAft>
-              <a:buClrTx/>
-              <a:buSzTx/>
-              <a:buFontTx/>
-              <a:buNone/>
-              <a:tabLst/>
-              <a:defRPr/>
-            </a:pPr>
-            <a:endParaRPr lang="en-IL" sz="1800" u="none" strike="noStrike" dirty="0">
-              <a:effectLst/>
-              <a:latin typeface="Arial" panose="020B0604020202020204" pitchFamily="34" charset="0"/>
-              <a:ea typeface="Arial" panose="020B0604020202020204" pitchFamily="34" charset="0"/>
-            </a:endParaRPr>
-          </a:p>
-          <a:p>
             <a:endParaRPr lang="en-IL" dirty="0"/>
           </a:p>
         </p:txBody>
@@ -3002,14 +2739,6 @@
           <a:bodyPr/>
           <a:lstStyle/>
           <a:p>
-            <a:r>
-              <a:rPr lang="he-IL" sz="1800" dirty="0">
-                <a:effectLst/>
-                <a:ea typeface="Arial" panose="020B0604020202020204" pitchFamily="34" charset="0"/>
-                <a:cs typeface="Arial" panose="020B0604020202020204" pitchFamily="34" charset="0"/>
-              </a:rPr>
-              <a:t>תיאור הפתרון </a:t>
-            </a:r>
             <a:endParaRPr lang="he-IL" dirty="0"/>
           </a:p>
         </p:txBody>
@@ -3111,246 +2840,6 @@
               <a:tabLst/>
               <a:defRPr/>
             </a:pPr>
-            <a:r>
-              <a:rPr lang="he-IL" sz="1800" dirty="0">
-                <a:effectLst/>
-                <a:ea typeface="Arial" panose="020B0604020202020204" pitchFamily="34" charset="0"/>
-                <a:cs typeface="Arial" panose="020B0604020202020204" pitchFamily="34" charset="0"/>
-              </a:rPr>
-              <a:t>תיאור הפתרון </a:t>
-            </a:r>
-            <a:endParaRPr lang="en-US" sz="1800" dirty="0">
-              <a:effectLst/>
-              <a:ea typeface="Arial" panose="020B0604020202020204" pitchFamily="34" charset="0"/>
-              <a:cs typeface="Arial" panose="020B0604020202020204" pitchFamily="34" charset="0"/>
-            </a:endParaRPr>
-          </a:p>
-          <a:p>
-            <a:pPr marL="0" marR="0" lvl="0" indent="0" algn="l" defTabSz="914400" rtl="0" eaLnBrk="1" fontAlgn="auto" latinLnBrk="0" hangingPunct="1">
-              <a:lnSpc>
-                <a:spcPct val="100000"/>
-              </a:lnSpc>
-              <a:spcBef>
-                <a:spcPts val="0"/>
-              </a:spcBef>
-              <a:spcAft>
-                <a:spcPts val="0"/>
-              </a:spcAft>
-              <a:buClrTx/>
-              <a:buSzTx/>
-              <a:buFontTx/>
-              <a:buNone/>
-              <a:tabLst/>
-              <a:defRPr/>
-            </a:pPr>
-            <a:r>
-              <a:rPr lang="he-IL" sz="1800" b="1" i="0" dirty="0">
-                <a:solidFill>
-                  <a:srgbClr val="FF9300"/>
-                </a:solidFill>
-                <a:effectLst/>
-                <a:latin typeface="Poppins" panose="020B0502040204020203" pitchFamily="2" charset="0"/>
-                <a:cs typeface="Arial" panose="020B0604020202020204" pitchFamily="34" charset="0"/>
-              </a:rPr>
-              <a:t>מומש ב</a:t>
-            </a:r>
-            <a:r>
-              <a:rPr lang="en-US" sz="1800" b="1" i="0" dirty="0" err="1">
-                <a:solidFill>
-                  <a:srgbClr val="FF9300"/>
-                </a:solidFill>
-                <a:effectLst/>
-                <a:latin typeface="Poppins" panose="020B0502040204020203" pitchFamily="2" charset="0"/>
-                <a:cs typeface="Arial" panose="020B0604020202020204" pitchFamily="34" charset="0"/>
-              </a:rPr>
-              <a:t>Cpp</a:t>
-            </a:r>
-            <a:endParaRPr lang="en-US" sz="1800" b="1" i="0" dirty="0">
-              <a:solidFill>
-                <a:srgbClr val="FF9300"/>
-              </a:solidFill>
-              <a:effectLst/>
-              <a:latin typeface="Poppins" panose="020B0502040204020203" pitchFamily="2" charset="0"/>
-              <a:cs typeface="Arial" panose="020B0604020202020204" pitchFamily="34" charset="0"/>
-            </a:endParaRPr>
-          </a:p>
-          <a:p>
-            <a:pPr marL="0" marR="0" lvl="0" indent="0" algn="l" defTabSz="914400" rtl="0" eaLnBrk="1" fontAlgn="auto" latinLnBrk="0" hangingPunct="1">
-              <a:lnSpc>
-                <a:spcPct val="100000"/>
-              </a:lnSpc>
-              <a:spcBef>
-                <a:spcPts val="0"/>
-              </a:spcBef>
-              <a:spcAft>
-                <a:spcPts val="0"/>
-              </a:spcAft>
-              <a:buClrTx/>
-              <a:buSzTx/>
-              <a:buFontTx/>
-              <a:buNone/>
-              <a:tabLst/>
-              <a:defRPr/>
-            </a:pPr>
-            <a:r>
-              <a:rPr lang="en-US" sz="1800" b="1" i="0" dirty="0">
-                <a:solidFill>
-                  <a:srgbClr val="FF9300"/>
-                </a:solidFill>
-                <a:effectLst/>
-                <a:latin typeface="Poppins" panose="020B0502040204020203" pitchFamily="2" charset="0"/>
-                <a:cs typeface="Arial" panose="020B0604020202020204" pitchFamily="34" charset="0"/>
-              </a:rPr>
-              <a:t>Using eigen</a:t>
-            </a:r>
-          </a:p>
-          <a:p>
-            <a:pPr marL="0" marR="0" lvl="0" indent="0" algn="l" defTabSz="914400" rtl="0" eaLnBrk="1" fontAlgn="auto" latinLnBrk="0" hangingPunct="1">
-              <a:lnSpc>
-                <a:spcPct val="100000"/>
-              </a:lnSpc>
-              <a:spcBef>
-                <a:spcPts val="0"/>
-              </a:spcBef>
-              <a:spcAft>
-                <a:spcPts val="0"/>
-              </a:spcAft>
-              <a:buClrTx/>
-              <a:buSzTx/>
-              <a:buFontTx/>
-              <a:buNone/>
-              <a:tabLst/>
-              <a:defRPr/>
-            </a:pPr>
-            <a:r>
-              <a:rPr lang="en-US" sz="1800" b="1" i="0" dirty="0">
-                <a:solidFill>
-                  <a:srgbClr val="FF9300"/>
-                </a:solidFill>
-                <a:effectLst/>
-                <a:latin typeface="Poppins" panose="020B0502040204020203" pitchFamily="2" charset="0"/>
-                <a:cs typeface="Arial" panose="020B0604020202020204" pitchFamily="34" charset="0"/>
-              </a:rPr>
-              <a:t>Testing with unit tests for finding the roots and such</a:t>
-            </a:r>
-          </a:p>
-          <a:p>
-            <a:pPr marL="0" marR="0" lvl="0" indent="0" algn="l" defTabSz="914400" rtl="0" eaLnBrk="1" fontAlgn="auto" latinLnBrk="0" hangingPunct="1">
-              <a:lnSpc>
-                <a:spcPct val="100000"/>
-              </a:lnSpc>
-              <a:spcBef>
-                <a:spcPts val="0"/>
-              </a:spcBef>
-              <a:spcAft>
-                <a:spcPts val="0"/>
-              </a:spcAft>
-              <a:buClrTx/>
-              <a:buSzTx/>
-              <a:buFontTx/>
-              <a:buNone/>
-              <a:tabLst/>
-              <a:defRPr/>
-            </a:pPr>
-            <a:r>
-              <a:rPr lang="en-US" sz="1800" b="1" i="0" dirty="0">
-                <a:solidFill>
-                  <a:srgbClr val="FF9300"/>
-                </a:solidFill>
-                <a:effectLst/>
-                <a:latin typeface="Poppins" panose="020B0502040204020203" pitchFamily="2" charset="0"/>
-                <a:cs typeface="Arial" panose="020B0604020202020204" pitchFamily="34" charset="0"/>
-              </a:rPr>
-              <a:t>Comparing </a:t>
-            </a:r>
-            <a:r>
-              <a:rPr lang="en-US" sz="1800" b="1" i="0" dirty="0" err="1">
-                <a:solidFill>
-                  <a:srgbClr val="FF9300"/>
-                </a:solidFill>
-                <a:effectLst/>
-                <a:latin typeface="Poppins" panose="020B0502040204020203" pitchFamily="2" charset="0"/>
-                <a:cs typeface="Arial" panose="020B0604020202020204" pitchFamily="34" charset="0"/>
-              </a:rPr>
-              <a:t>rasults</a:t>
-            </a:r>
-            <a:r>
-              <a:rPr lang="en-US" sz="1800" b="1" i="0" dirty="0">
-                <a:solidFill>
-                  <a:srgbClr val="FF9300"/>
-                </a:solidFill>
-                <a:effectLst/>
-                <a:latin typeface="Poppins" panose="020B0502040204020203" pitchFamily="2" charset="0"/>
-                <a:cs typeface="Arial" panose="020B0604020202020204" pitchFamily="34" charset="0"/>
-              </a:rPr>
-              <a:t> using </a:t>
-            </a:r>
-            <a:r>
-              <a:rPr lang="en-US" sz="1800" b="1" i="0" dirty="0" err="1">
-                <a:solidFill>
-                  <a:srgbClr val="FF9300"/>
-                </a:solidFill>
-                <a:effectLst/>
-                <a:latin typeface="Poppins" panose="020B0502040204020203" pitchFamily="2" charset="0"/>
-                <a:cs typeface="Arial" panose="020B0604020202020204" pitchFamily="34" charset="0"/>
-              </a:rPr>
-              <a:t>celectrak</a:t>
-            </a:r>
-            <a:r>
-              <a:rPr lang="en-US" sz="1800" b="1" i="0" dirty="0">
-                <a:solidFill>
-                  <a:srgbClr val="FF9300"/>
-                </a:solidFill>
-                <a:effectLst/>
-                <a:latin typeface="Poppins" panose="020B0502040204020203" pitchFamily="2" charset="0"/>
-                <a:cs typeface="Arial" panose="020B0604020202020204" pitchFamily="34" charset="0"/>
-              </a:rPr>
-              <a:t> website and </a:t>
-            </a:r>
-            <a:r>
-              <a:rPr lang="en-US" sz="1800" b="1" i="0" dirty="0" err="1">
-                <a:solidFill>
-                  <a:srgbClr val="FF9300"/>
-                </a:solidFill>
-                <a:effectLst/>
-                <a:latin typeface="Poppins" panose="020B0502040204020203" pitchFamily="2" charset="0"/>
-                <a:cs typeface="Arial" panose="020B0604020202020204" pitchFamily="34" charset="0"/>
-              </a:rPr>
-              <a:t>sicrates</a:t>
-            </a:r>
-            <a:r>
-              <a:rPr lang="en-US" sz="1800" b="1" i="0" dirty="0">
-                <a:solidFill>
-                  <a:srgbClr val="FF9300"/>
-                </a:solidFill>
-                <a:effectLst/>
-                <a:latin typeface="Poppins" panose="020B0502040204020203" pitchFamily="2" charset="0"/>
-                <a:cs typeface="Arial" panose="020B0604020202020204" pitchFamily="34" charset="0"/>
-              </a:rPr>
-              <a:t> project(showing possible </a:t>
-            </a:r>
-            <a:r>
-              <a:rPr lang="en-US" sz="1800" b="1" i="0" dirty="0" err="1">
-                <a:solidFill>
-                  <a:srgbClr val="FF9300"/>
-                </a:solidFill>
-                <a:effectLst/>
-                <a:latin typeface="Poppins" panose="020B0502040204020203" pitchFamily="2" charset="0"/>
-                <a:cs typeface="Arial" panose="020B0604020202020204" pitchFamily="34" charset="0"/>
-              </a:rPr>
-              <a:t>collosions</a:t>
-            </a:r>
-            <a:r>
-              <a:rPr lang="en-US" sz="1800" b="1" i="0" dirty="0">
-                <a:solidFill>
-                  <a:srgbClr val="FF9300"/>
-                </a:solidFill>
-                <a:effectLst/>
-                <a:latin typeface="Poppins" panose="020B0502040204020203" pitchFamily="2" charset="0"/>
-                <a:cs typeface="Arial" panose="020B0604020202020204" pitchFamily="34" charset="0"/>
-              </a:rPr>
-              <a:t> and TLE available)</a:t>
-            </a:r>
             <a:endParaRPr lang="en-US" b="1" i="0" dirty="0">
               <a:solidFill>
                 <a:srgbClr val="FF9300"/>
@@ -3458,14 +2947,6 @@
               <a:tabLst/>
               <a:defRPr/>
             </a:pPr>
-            <a:r>
-              <a:rPr lang="he-IL" sz="1800" dirty="0">
-                <a:effectLst/>
-                <a:ea typeface="Arial" panose="020B0604020202020204" pitchFamily="34" charset="0"/>
-                <a:cs typeface="Arial" panose="020B0604020202020204" pitchFamily="34" charset="0"/>
-              </a:rPr>
-              <a:t>תיאור הפתרון </a:t>
-            </a:r>
             <a:endParaRPr lang="en-US" b="1" i="0" dirty="0">
               <a:solidFill>
                 <a:srgbClr val="FF9300"/>
@@ -3573,17 +3054,6 @@
               <a:tabLst/>
               <a:defRPr/>
             </a:pPr>
-            <a:r>
-              <a:rPr lang="en-US" sz="1800" b="1" i="0" dirty="0">
-                <a:solidFill>
-                  <a:srgbClr val="FF9300"/>
-                </a:solidFill>
-                <a:effectLst/>
-                <a:latin typeface="Poppins" panose="020B0502040204020203" pitchFamily="2" charset="0"/>
-                <a:cs typeface="Arial" panose="020B0604020202020204" pitchFamily="34" charset="0"/>
-              </a:rPr>
-              <a:t>Package diagrams</a:t>
-            </a:r>
             <a:endParaRPr lang="en-US" b="1" i="0" dirty="0">
               <a:solidFill>
                 <a:srgbClr val="FF9300"/>
@@ -3759,7 +3229,7 @@
           <a:p>
             <a:fld id="{09A7E1CA-0E8E-4CFC-B978-E4AD40DD9644}" type="datetime1">
               <a:rPr lang="en-US" smtClean="0"/>
-              <a:t>5/4/2024</a:t>
+              <a:t>5/5/2024</a:t>
             </a:fld>
             <a:endParaRPr lang="en-US"/>
           </a:p>
@@ -3927,7 +3397,7 @@
           <a:p>
             <a:fld id="{1E4ED3D9-BF5A-4E88-8B0B-ADEE67DDE257}" type="datetime1">
               <a:rPr lang="en-US" smtClean="0"/>
-              <a:t>5/4/2024</a:t>
+              <a:t>5/5/2024</a:t>
             </a:fld>
             <a:endParaRPr lang="en-US"/>
           </a:p>
@@ -4105,7 +3575,7 @@
           <a:p>
             <a:fld id="{2B504B56-471A-446F-8040-32DEE7852E71}" type="datetime1">
               <a:rPr lang="en-US" smtClean="0"/>
-              <a:t>5/4/2024</a:t>
+              <a:t>5/5/2024</a:t>
             </a:fld>
             <a:endParaRPr lang="en-US"/>
           </a:p>
@@ -4273,7 +3743,7 @@
           <a:p>
             <a:fld id="{B1C1AB24-0193-40E2-B63A-16D46CB806C0}" type="datetime1">
               <a:rPr lang="en-US" smtClean="0"/>
-              <a:t>5/4/2024</a:t>
+              <a:t>5/5/2024</a:t>
             </a:fld>
             <a:endParaRPr lang="en-US"/>
           </a:p>
@@ -4518,7 +3988,7 @@
           <a:p>
             <a:fld id="{675EAB41-B173-4881-B330-DD53A86AC43F}" type="datetime1">
               <a:rPr lang="en-US" smtClean="0"/>
-              <a:t>5/4/2024</a:t>
+              <a:t>5/5/2024</a:t>
             </a:fld>
             <a:endParaRPr lang="en-US"/>
           </a:p>
@@ -4747,7 +4217,7 @@
           <a:p>
             <a:fld id="{EB8368F2-ED58-4E75-8955-2DC12E50DD38}" type="datetime1">
               <a:rPr lang="en-US" smtClean="0"/>
-              <a:t>5/4/2024</a:t>
+              <a:t>5/5/2024</a:t>
             </a:fld>
             <a:endParaRPr lang="en-US"/>
           </a:p>
@@ -5111,7 +4581,7 @@
           <a:p>
             <a:fld id="{85207799-A15D-4227-A5B8-688CD1EDE226}" type="datetime1">
               <a:rPr lang="en-US" smtClean="0"/>
-              <a:t>5/4/2024</a:t>
+              <a:t>5/5/2024</a:t>
             </a:fld>
             <a:endParaRPr lang="en-US"/>
           </a:p>
@@ -5228,7 +4698,7 @@
           <a:p>
             <a:fld id="{BE15B18B-A15E-43D5-A707-246E6B3D0056}" type="datetime1">
               <a:rPr lang="en-US" smtClean="0"/>
-              <a:t>5/4/2024</a:t>
+              <a:t>5/5/2024</a:t>
             </a:fld>
             <a:endParaRPr lang="en-US"/>
           </a:p>
@@ -5323,7 +4793,7 @@
           <a:p>
             <a:fld id="{9AE79651-376C-43AE-B653-9444EB27B5B9}" type="datetime1">
               <a:rPr lang="en-US" smtClean="0"/>
-              <a:t>5/4/2024</a:t>
+              <a:t>5/5/2024</a:t>
             </a:fld>
             <a:endParaRPr lang="en-US"/>
           </a:p>
@@ -5598,7 +5068,7 @@
           <a:p>
             <a:fld id="{3D3E496D-C7F2-4742-A227-43B7F16ABA0F}" type="datetime1">
               <a:rPr lang="en-US" smtClean="0"/>
-              <a:t>5/4/2024</a:t>
+              <a:t>5/5/2024</a:t>
             </a:fld>
             <a:endParaRPr lang="en-US"/>
           </a:p>
@@ -5853,7 +5323,7 @@
           <a:p>
             <a:fld id="{2A3796D6-2B10-46B3-9F87-14CA024E156E}" type="datetime1">
               <a:rPr lang="en-US" smtClean="0"/>
-              <a:t>5/4/2024</a:t>
+              <a:t>5/5/2024</a:t>
             </a:fld>
             <a:endParaRPr lang="en-US"/>
           </a:p>
@@ -6064,7 +5534,7 @@
           <a:p>
             <a:fld id="{7E953223-B5A8-43DB-9D06-C28A96C6A2D6}" type="datetime1">
               <a:rPr lang="en-US" smtClean="0"/>
-              <a:t>5/4/2024</a:t>
+              <a:t>5/5/2024</a:t>
             </a:fld>
             <a:endParaRPr lang="en-US"/>
           </a:p>
@@ -17791,18 +17261,18 @@
 </file>
 
 <file path=customXml/item1.xml><?xml version="1.0" encoding="utf-8"?>
+<p:properties xmlns:p="http://schemas.microsoft.com/office/2006/metadata/properties" xmlns:xsi="http://www.w3.org/2001/XMLSchema-instance" xmlns:pc="http://schemas.microsoft.com/office/infopath/2007/PartnerControls">
+  <documentManagement/>
+</p:properties>
+</file>
+
+<file path=customXml/item2.xml><?xml version="1.0" encoding="utf-8"?>
 <?mso-contentType ?>
 <FormTemplates xmlns="http://schemas.microsoft.com/sharepoint/v3/contenttype/forms">
   <Display>DocumentLibraryForm</Display>
   <Edit>DocumentLibraryForm</Edit>
   <New>DocumentLibraryForm</New>
 </FormTemplates>
-</file>
-
-<file path=customXml/item2.xml><?xml version="1.0" encoding="utf-8"?>
-<p:properties xmlns:p="http://schemas.microsoft.com/office/2006/metadata/properties" xmlns:xsi="http://www.w3.org/2001/XMLSchema-instance" xmlns:pc="http://schemas.microsoft.com/office/infopath/2007/PartnerControls">
-  <documentManagement/>
-</p:properties>
 </file>
 
 <file path=customXml/item3.xml><?xml version="1.0" encoding="utf-8"?>
@@ -17977,14 +17447,6 @@
 </file>
 
 <file path=customXml/itemProps1.xml><?xml version="1.0" encoding="utf-8"?>
-<ds:datastoreItem xmlns:ds="http://schemas.openxmlformats.org/officeDocument/2006/customXml" ds:itemID="{7733A369-0DEF-413E-AB3C-537D3682C87C}">
-  <ds:schemaRefs>
-    <ds:schemaRef ds:uri="http://schemas.microsoft.com/sharepoint/v3/contenttype/forms"/>
-  </ds:schemaRefs>
-</ds:datastoreItem>
-</file>
-
-<file path=customXml/itemProps2.xml><?xml version="1.0" encoding="utf-8"?>
 <ds:datastoreItem xmlns:ds="http://schemas.openxmlformats.org/officeDocument/2006/customXml" ds:itemID="{1A5D468B-6206-47E4-A39B-51F47BC537E8}">
   <ds:schemaRefs>
     <ds:schemaRef ds:uri="http://schemas.openxmlformats.org/package/2006/metadata/core-properties"/>
@@ -17997,6 +17459,14 @@
     <ds:schemaRef ds:uri="4c7b9de7-e58c-4ace-87d5-9a60f3b223c2"/>
     <ds:schemaRef ds:uri="http://www.w3.org/XML/1998/namespace"/>
     <ds:schemaRef ds:uri="http://purl.org/dc/dcmitype/"/>
+  </ds:schemaRefs>
+</ds:datastoreItem>
+</file>
+
+<file path=customXml/itemProps2.xml><?xml version="1.0" encoding="utf-8"?>
+<ds:datastoreItem xmlns:ds="http://schemas.openxmlformats.org/officeDocument/2006/customXml" ds:itemID="{7733A369-0DEF-413E-AB3C-537D3682C87C}">
+  <ds:schemaRefs>
+    <ds:schemaRef ds:uri="http://schemas.microsoft.com/sharepoint/v3/contenttype/forms"/>
   </ds:schemaRefs>
 </ds:datastoreItem>
 </file>

</xml_diff>

<commit_message>
-Updated Project Book -Updated Project book pdf
</commit_message>
<xml_diff>
--- a/Capstone Project Phase B–23-2-D-17.pptx
+++ b/Capstone Project Phase B–23-2-D-17.pptx
@@ -223,7 +223,7 @@
           <a:p>
             <a:fld id="{2442D881-CA12-4970-8156-2388B9CD2E9F}" type="datetimeFigureOut">
               <a:rPr lang="en-IL" smtClean="0"/>
-              <a:t>05/05/2024</a:t>
+              <a:t>06/05/2024</a:t>
             </a:fld>
             <a:endParaRPr lang="en-IL"/>
           </a:p>
@@ -3229,7 +3229,7 @@
           <a:p>
             <a:fld id="{09A7E1CA-0E8E-4CFC-B978-E4AD40DD9644}" type="datetime1">
               <a:rPr lang="en-US" smtClean="0"/>
-              <a:t>5/5/2024</a:t>
+              <a:t>5/6/2024</a:t>
             </a:fld>
             <a:endParaRPr lang="en-US"/>
           </a:p>
@@ -3397,7 +3397,7 @@
           <a:p>
             <a:fld id="{1E4ED3D9-BF5A-4E88-8B0B-ADEE67DDE257}" type="datetime1">
               <a:rPr lang="en-US" smtClean="0"/>
-              <a:t>5/5/2024</a:t>
+              <a:t>5/6/2024</a:t>
             </a:fld>
             <a:endParaRPr lang="en-US"/>
           </a:p>
@@ -3575,7 +3575,7 @@
           <a:p>
             <a:fld id="{2B504B56-471A-446F-8040-32DEE7852E71}" type="datetime1">
               <a:rPr lang="en-US" smtClean="0"/>
-              <a:t>5/5/2024</a:t>
+              <a:t>5/6/2024</a:t>
             </a:fld>
             <a:endParaRPr lang="en-US"/>
           </a:p>
@@ -3743,7 +3743,7 @@
           <a:p>
             <a:fld id="{B1C1AB24-0193-40E2-B63A-16D46CB806C0}" type="datetime1">
               <a:rPr lang="en-US" smtClean="0"/>
-              <a:t>5/5/2024</a:t>
+              <a:t>5/6/2024</a:t>
             </a:fld>
             <a:endParaRPr lang="en-US"/>
           </a:p>
@@ -3988,7 +3988,7 @@
           <a:p>
             <a:fld id="{675EAB41-B173-4881-B330-DD53A86AC43F}" type="datetime1">
               <a:rPr lang="en-US" smtClean="0"/>
-              <a:t>5/5/2024</a:t>
+              <a:t>5/6/2024</a:t>
             </a:fld>
             <a:endParaRPr lang="en-US"/>
           </a:p>
@@ -4217,7 +4217,7 @@
           <a:p>
             <a:fld id="{EB8368F2-ED58-4E75-8955-2DC12E50DD38}" type="datetime1">
               <a:rPr lang="en-US" smtClean="0"/>
-              <a:t>5/5/2024</a:t>
+              <a:t>5/6/2024</a:t>
             </a:fld>
             <a:endParaRPr lang="en-US"/>
           </a:p>
@@ -4581,7 +4581,7 @@
           <a:p>
             <a:fld id="{85207799-A15D-4227-A5B8-688CD1EDE226}" type="datetime1">
               <a:rPr lang="en-US" smtClean="0"/>
-              <a:t>5/5/2024</a:t>
+              <a:t>5/6/2024</a:t>
             </a:fld>
             <a:endParaRPr lang="en-US"/>
           </a:p>
@@ -4698,7 +4698,7 @@
           <a:p>
             <a:fld id="{BE15B18B-A15E-43D5-A707-246E6B3D0056}" type="datetime1">
               <a:rPr lang="en-US" smtClean="0"/>
-              <a:t>5/5/2024</a:t>
+              <a:t>5/6/2024</a:t>
             </a:fld>
             <a:endParaRPr lang="en-US"/>
           </a:p>
@@ -4793,7 +4793,7 @@
           <a:p>
             <a:fld id="{9AE79651-376C-43AE-B653-9444EB27B5B9}" type="datetime1">
               <a:rPr lang="en-US" smtClean="0"/>
-              <a:t>5/5/2024</a:t>
+              <a:t>5/6/2024</a:t>
             </a:fld>
             <a:endParaRPr lang="en-US"/>
           </a:p>
@@ -5068,7 +5068,7 @@
           <a:p>
             <a:fld id="{3D3E496D-C7F2-4742-A227-43B7F16ABA0F}" type="datetime1">
               <a:rPr lang="en-US" smtClean="0"/>
-              <a:t>5/5/2024</a:t>
+              <a:t>5/6/2024</a:t>
             </a:fld>
             <a:endParaRPr lang="en-US"/>
           </a:p>
@@ -5323,7 +5323,7 @@
           <a:p>
             <a:fld id="{2A3796D6-2B10-46B3-9F87-14CA024E156E}" type="datetime1">
               <a:rPr lang="en-US" smtClean="0"/>
-              <a:t>5/5/2024</a:t>
+              <a:t>5/6/2024</a:t>
             </a:fld>
             <a:endParaRPr lang="en-US"/>
           </a:p>
@@ -5534,7 +5534,7 @@
           <a:p>
             <a:fld id="{7E953223-B5A8-43DB-9D06-C28A96C6A2D6}" type="datetime1">
               <a:rPr lang="en-US" smtClean="0"/>
-              <a:t>5/5/2024</a:t>
+              <a:t>5/6/2024</a:t>
             </a:fld>
             <a:endParaRPr lang="en-US"/>
           </a:p>
@@ -8195,7 +8195,7 @@
           <p:nvPr>
             <p:extLst>
               <p:ext uri="{D42A27DB-BD31-4B8C-83A1-F6EECF244321}">
-                <p14:modId xmlns:p14="http://schemas.microsoft.com/office/powerpoint/2010/main" val="1631686831"/>
+                <p14:modId xmlns:p14="http://schemas.microsoft.com/office/powerpoint/2010/main" val="2222064581"/>
               </p:ext>
             </p:extLst>
           </p:nvPr>
@@ -8253,7 +8253,7 @@
                       <a:pPr algn="ctr"/>
                       <a:r>
                         <a:rPr lang="en-US" dirty="0"/>
-                        <a:t>OBC[ ]</a:t>
+                        <a:t>OBC</a:t>
                       </a:r>
                       <a:endParaRPr lang="en-IL" dirty="0"/>
                     </a:p>
@@ -17261,18 +17261,18 @@
 </file>
 
 <file path=customXml/item1.xml><?xml version="1.0" encoding="utf-8"?>
-<p:properties xmlns:p="http://schemas.microsoft.com/office/2006/metadata/properties" xmlns:xsi="http://www.w3.org/2001/XMLSchema-instance" xmlns:pc="http://schemas.microsoft.com/office/infopath/2007/PartnerControls">
-  <documentManagement/>
-</p:properties>
-</file>
-
-<file path=customXml/item2.xml><?xml version="1.0" encoding="utf-8"?>
 <?mso-contentType ?>
 <FormTemplates xmlns="http://schemas.microsoft.com/sharepoint/v3/contenttype/forms">
   <Display>DocumentLibraryForm</Display>
   <Edit>DocumentLibraryForm</Edit>
   <New>DocumentLibraryForm</New>
 </FormTemplates>
+</file>
+
+<file path=customXml/item2.xml><?xml version="1.0" encoding="utf-8"?>
+<p:properties xmlns:p="http://schemas.microsoft.com/office/2006/metadata/properties" xmlns:xsi="http://www.w3.org/2001/XMLSchema-instance" xmlns:pc="http://schemas.microsoft.com/office/infopath/2007/PartnerControls">
+  <documentManagement/>
+</p:properties>
 </file>
 
 <file path=customXml/item3.xml><?xml version="1.0" encoding="utf-8"?>
@@ -17447,6 +17447,14 @@
 </file>
 
 <file path=customXml/itemProps1.xml><?xml version="1.0" encoding="utf-8"?>
+<ds:datastoreItem xmlns:ds="http://schemas.openxmlformats.org/officeDocument/2006/customXml" ds:itemID="{7733A369-0DEF-413E-AB3C-537D3682C87C}">
+  <ds:schemaRefs>
+    <ds:schemaRef ds:uri="http://schemas.microsoft.com/sharepoint/v3/contenttype/forms"/>
+  </ds:schemaRefs>
+</ds:datastoreItem>
+</file>
+
+<file path=customXml/itemProps2.xml><?xml version="1.0" encoding="utf-8"?>
 <ds:datastoreItem xmlns:ds="http://schemas.openxmlformats.org/officeDocument/2006/customXml" ds:itemID="{1A5D468B-6206-47E4-A39B-51F47BC537E8}">
   <ds:schemaRefs>
     <ds:schemaRef ds:uri="http://schemas.openxmlformats.org/package/2006/metadata/core-properties"/>
@@ -17459,14 +17467,6 @@
     <ds:schemaRef ds:uri="4c7b9de7-e58c-4ace-87d5-9a60f3b223c2"/>
     <ds:schemaRef ds:uri="http://www.w3.org/XML/1998/namespace"/>
     <ds:schemaRef ds:uri="http://purl.org/dc/dcmitype/"/>
-  </ds:schemaRefs>
-</ds:datastoreItem>
-</file>
-
-<file path=customXml/itemProps2.xml><?xml version="1.0" encoding="utf-8"?>
-<ds:datastoreItem xmlns:ds="http://schemas.openxmlformats.org/officeDocument/2006/customXml" ds:itemID="{7733A369-0DEF-413E-AB3C-537D3682C87C}">
-  <ds:schemaRefs>
-    <ds:schemaRef ds:uri="http://schemas.microsoft.com/sharepoint/v3/contenttype/forms"/>
   </ds:schemaRefs>
 </ds:datastoreItem>
 </file>

</xml_diff>